<commit_message>
First versions of presentations
</commit_message>
<xml_diff>
--- a/1 - Apresentações/02 - Probabilidades Condicionais.pptx
+++ b/1 - Apresentações/02 - Probabilidades Condicionais.pptx
@@ -8921,7 +8921,7 @@
           <a:p>
             <a:fld id="{59F616A3-CE59-47A3-8E86-B7098AA47CDF}" type="datetimeFigureOut">
               <a:rPr lang="en-US" smtClean="0"/>
-              <a:t>5/31/2021</a:t>
+              <a:t>6/16/2021</a:t>
             </a:fld>
             <a:endParaRPr lang="en-US"/>
           </a:p>
@@ -9128,7 +9128,7 @@
           <a:p>
             <a:fld id="{59F616A3-CE59-47A3-8E86-B7098AA47CDF}" type="datetimeFigureOut">
               <a:rPr lang="en-US" smtClean="0"/>
-              <a:t>5/31/2021</a:t>
+              <a:t>6/16/2021</a:t>
             </a:fld>
             <a:endParaRPr lang="en-US"/>
           </a:p>
@@ -9308,7 +9308,7 @@
           <a:p>
             <a:fld id="{59F616A3-CE59-47A3-8E86-B7098AA47CDF}" type="datetimeFigureOut">
               <a:rPr lang="en-US" smtClean="0"/>
-              <a:t>5/31/2021</a:t>
+              <a:t>6/16/2021</a:t>
             </a:fld>
             <a:endParaRPr lang="en-US"/>
           </a:p>
@@ -9513,7 +9513,7 @@
           <a:p>
             <a:fld id="{59F616A3-CE59-47A3-8E86-B7098AA47CDF}" type="datetimeFigureOut">
               <a:rPr lang="en-US" smtClean="0"/>
-              <a:t>5/31/2021</a:t>
+              <a:t>6/16/2021</a:t>
             </a:fld>
             <a:endParaRPr lang="en-US"/>
           </a:p>
@@ -18411,7 +18411,7 @@
           <a:p>
             <a:fld id="{59F616A3-CE59-47A3-8E86-B7098AA47CDF}" type="datetimeFigureOut">
               <a:rPr lang="en-US" smtClean="0"/>
-              <a:t>5/31/2021</a:t>
+              <a:t>6/16/2021</a:t>
             </a:fld>
             <a:endParaRPr lang="en-US"/>
           </a:p>
@@ -18685,7 +18685,7 @@
           <a:p>
             <a:fld id="{59F616A3-CE59-47A3-8E86-B7098AA47CDF}" type="datetimeFigureOut">
               <a:rPr lang="en-US" smtClean="0"/>
-              <a:t>5/31/2021</a:t>
+              <a:t>6/16/2021</a:t>
             </a:fld>
             <a:endParaRPr lang="en-US"/>
           </a:p>
@@ -19083,7 +19083,7 @@
           <a:p>
             <a:fld id="{59F616A3-CE59-47A3-8E86-B7098AA47CDF}" type="datetimeFigureOut">
               <a:rPr lang="en-US" smtClean="0"/>
-              <a:t>5/31/2021</a:t>
+              <a:t>6/16/2021</a:t>
             </a:fld>
             <a:endParaRPr lang="en-US"/>
           </a:p>
@@ -19201,7 +19201,7 @@
           <a:p>
             <a:fld id="{59F616A3-CE59-47A3-8E86-B7098AA47CDF}" type="datetimeFigureOut">
               <a:rPr lang="en-US" smtClean="0"/>
-              <a:t>5/31/2021</a:t>
+              <a:t>6/16/2021</a:t>
             </a:fld>
             <a:endParaRPr lang="en-US"/>
           </a:p>
@@ -19296,7 +19296,7 @@
           <a:p>
             <a:fld id="{59F616A3-CE59-47A3-8E86-B7098AA47CDF}" type="datetimeFigureOut">
               <a:rPr lang="en-US" smtClean="0"/>
-              <a:t>5/31/2021</a:t>
+              <a:t>6/16/2021</a:t>
             </a:fld>
             <a:endParaRPr lang="en-US"/>
           </a:p>
@@ -19586,7 +19586,7 @@
           <a:p>
             <a:fld id="{59F616A3-CE59-47A3-8E86-B7098AA47CDF}" type="datetimeFigureOut">
               <a:rPr lang="en-US" smtClean="0"/>
-              <a:t>5/31/2021</a:t>
+              <a:t>6/16/2021</a:t>
             </a:fld>
             <a:endParaRPr lang="en-US"/>
           </a:p>
@@ -19866,7 +19866,7 @@
           <a:p>
             <a:fld id="{59F616A3-CE59-47A3-8E86-B7098AA47CDF}" type="datetimeFigureOut">
               <a:rPr lang="en-US" smtClean="0"/>
-              <a:t>5/31/2021</a:t>
+              <a:t>6/16/2021</a:t>
             </a:fld>
             <a:endParaRPr lang="en-US"/>
           </a:p>
@@ -20116,7 +20116,7 @@
           <a:p>
             <a:fld id="{59F616A3-CE59-47A3-8E86-B7098AA47CDF}" type="datetimeFigureOut">
               <a:rPr lang="en-US" smtClean="0"/>
-              <a:t>5/31/2021</a:t>
+              <a:t>6/16/2021</a:t>
             </a:fld>
             <a:endParaRPr lang="en-US"/>
           </a:p>
@@ -22392,8 +22392,8 @@
           </a:p>
         </p:txBody>
       </p:sp>
-      <mc:AlternateContent xmlns:mc="http://schemas.openxmlformats.org/markup-compatibility/2006">
-        <mc:Choice xmlns:a14="http://schemas.microsoft.com/office/drawing/2010/main" Requires="a14">
+      <mc:AlternateContent xmlns:mc="http://schemas.openxmlformats.org/markup-compatibility/2006" xmlns:a14="http://schemas.microsoft.com/office/drawing/2010/main">
+        <mc:Choice Requires="a14">
           <p:sp>
             <p:nvSpPr>
               <p:cNvPr id="3" name="Title 1">
@@ -22540,7 +22540,7 @@
             </p:txBody>
           </p:sp>
         </mc:Choice>
-        <mc:Fallback>
+        <mc:Fallback xmlns="">
           <p:sp>
             <p:nvSpPr>
               <p:cNvPr id="3" name="Title 1">
@@ -32451,6 +32451,9 @@
                     <m:oMath xmlns:m="http://schemas.openxmlformats.org/officeDocument/2006/math">
                       <m:r>
                         <a:rPr lang="en-US" sz="2800" b="0" i="1" smtClean="0">
+                          <a:solidFill>
+                            <a:srgbClr val="0070C0"/>
+                          </a:solidFill>
                           <a:latin typeface="Cambria Math" panose="02040503050406030204" pitchFamily="18" charset="0"/>
                         </a:rPr>
                         <m:t>𝑃</m:t>
@@ -32459,6 +32462,9 @@
                         <m:dPr>
                           <m:ctrlPr>
                             <a:rPr lang="en-US" sz="2800" b="0" i="1" smtClean="0">
+                              <a:solidFill>
+                                <a:srgbClr val="0070C0"/>
+                              </a:solidFill>
                               <a:latin typeface="Cambria Math" panose="02040503050406030204" pitchFamily="18" charset="0"/>
                             </a:rPr>
                           </m:ctrlPr>
@@ -32466,6 +32472,9 @@
                         <m:e>
                           <m:r>
                             <a:rPr lang="en-US" sz="2800" b="0" i="1" smtClean="0">
+                              <a:solidFill>
+                                <a:srgbClr val="0070C0"/>
+                              </a:solidFill>
                               <a:latin typeface="Cambria Math" panose="02040503050406030204" pitchFamily="18" charset="0"/>
                             </a:rPr>
                             <m:t>𝐴</m:t>
@@ -32474,6 +32483,9 @@
                         <m:e>
                           <m:r>
                             <a:rPr lang="en-US" sz="2800" b="0" i="1" smtClean="0">
+                              <a:solidFill>
+                                <a:srgbClr val="0070C0"/>
+                              </a:solidFill>
                               <a:latin typeface="Cambria Math" panose="02040503050406030204" pitchFamily="18" charset="0"/>
                             </a:rPr>
                             <m:t>𝐵</m:t>
@@ -32482,6 +32494,9 @@
                       </m:d>
                       <m:r>
                         <a:rPr lang="en-US" sz="2800" b="0" i="1" smtClean="0">
+                          <a:solidFill>
+                            <a:srgbClr val="0070C0"/>
+                          </a:solidFill>
                           <a:latin typeface="Cambria Math" panose="02040503050406030204" pitchFamily="18" charset="0"/>
                         </a:rPr>
                         <m:t>𝑃</m:t>
@@ -32490,6 +32505,9 @@
                         <m:dPr>
                           <m:ctrlPr>
                             <a:rPr lang="en-US" sz="2800" b="0" i="1" smtClean="0">
+                              <a:solidFill>
+                                <a:srgbClr val="0070C0"/>
+                              </a:solidFill>
                               <a:latin typeface="Cambria Math" panose="02040503050406030204" pitchFamily="18" charset="0"/>
                             </a:rPr>
                           </m:ctrlPr>
@@ -32497,6 +32515,9 @@
                         <m:e>
                           <m:r>
                             <a:rPr lang="en-US" sz="2800" b="0" i="1" smtClean="0">
+                              <a:solidFill>
+                                <a:srgbClr val="0070C0"/>
+                              </a:solidFill>
                               <a:latin typeface="Cambria Math" panose="02040503050406030204" pitchFamily="18" charset="0"/>
                             </a:rPr>
                             <m:t>𝐵</m:t>
@@ -32505,12 +32526,18 @@
                       </m:d>
                       <m:r>
                         <a:rPr lang="en-US" sz="2800" b="0" i="1" smtClean="0">
+                          <a:solidFill>
+                            <a:srgbClr val="0070C0"/>
+                          </a:solidFill>
                           <a:latin typeface="Cambria Math" panose="02040503050406030204" pitchFamily="18" charset="0"/>
                         </a:rPr>
                         <m:t>=</m:t>
                       </m:r>
                       <m:r>
                         <a:rPr lang="en-US" sz="2800" b="0" i="1" smtClean="0">
+                          <a:solidFill>
+                            <a:srgbClr val="0070C0"/>
+                          </a:solidFill>
                           <a:latin typeface="Cambria Math" panose="02040503050406030204" pitchFamily="18" charset="0"/>
                         </a:rPr>
                         <m:t>𝑃</m:t>
@@ -32519,6 +32546,9 @@
                         <m:dPr>
                           <m:ctrlPr>
                             <a:rPr lang="en-US" sz="2800" b="0" i="1" smtClean="0">
+                              <a:solidFill>
+                                <a:srgbClr val="0070C0"/>
+                              </a:solidFill>
                               <a:latin typeface="Cambria Math" panose="02040503050406030204" pitchFamily="18" charset="0"/>
                             </a:rPr>
                           </m:ctrlPr>
@@ -32526,6 +32556,9 @@
                         <m:e>
                           <m:r>
                             <a:rPr lang="en-US" sz="2800" b="0" i="1" smtClean="0">
+                              <a:solidFill>
+                                <a:srgbClr val="0070C0"/>
+                              </a:solidFill>
                               <a:latin typeface="Cambria Math" panose="02040503050406030204" pitchFamily="18" charset="0"/>
                             </a:rPr>
                             <m:t>𝐵</m:t>
@@ -32534,6 +32567,9 @@
                         <m:e>
                           <m:r>
                             <a:rPr lang="en-US" sz="2800" b="0" i="1" smtClean="0">
+                              <a:solidFill>
+                                <a:srgbClr val="0070C0"/>
+                              </a:solidFill>
                               <a:latin typeface="Cambria Math" panose="02040503050406030204" pitchFamily="18" charset="0"/>
                             </a:rPr>
                             <m:t>𝐴</m:t>
@@ -32542,6 +32578,9 @@
                       </m:d>
                       <m:r>
                         <a:rPr lang="en-US" sz="2800" b="0" i="1" smtClean="0">
+                          <a:solidFill>
+                            <a:srgbClr val="0070C0"/>
+                          </a:solidFill>
                           <a:latin typeface="Cambria Math" panose="02040503050406030204" pitchFamily="18" charset="0"/>
                         </a:rPr>
                         <m:t>𝑃</m:t>
@@ -32550,6 +32589,9 @@
                         <m:dPr>
                           <m:ctrlPr>
                             <a:rPr lang="en-US" sz="2800" b="0" i="1" smtClean="0">
+                              <a:solidFill>
+                                <a:srgbClr val="0070C0"/>
+                              </a:solidFill>
                               <a:latin typeface="Cambria Math" panose="02040503050406030204" pitchFamily="18" charset="0"/>
                             </a:rPr>
                           </m:ctrlPr>
@@ -32557,6 +32599,9 @@
                         <m:e>
                           <m:r>
                             <a:rPr lang="en-US" sz="2800" b="0" i="1" smtClean="0">
+                              <a:solidFill>
+                                <a:srgbClr val="0070C0"/>
+                              </a:solidFill>
                               <a:latin typeface="Cambria Math" panose="02040503050406030204" pitchFamily="18" charset="0"/>
                             </a:rPr>
                             <m:t>𝐴</m:t>
@@ -32566,7 +32611,11 @@
                     </m:oMath>
                   </m:oMathPara>
                 </a14:m>
-                <a:endParaRPr lang="en-US" sz="2800" dirty="0"/>
+                <a:endParaRPr lang="en-US" sz="2800" dirty="0">
+                  <a:solidFill>
+                    <a:srgbClr val="0070C0"/>
+                  </a:solidFill>
+                </a:endParaRPr>
               </a:p>
               <a:p>
                 <a:pPr marL="0" indent="0">
@@ -32676,6 +32725,22 @@
               <a:rPr lang="en-US" dirty="0"/>
               <a:t>|B) e P(B|A)</a:t>
             </a:r>
+            <a:br>
+              <a:rPr lang="en-US" dirty="0"/>
+            </a:br>
+            <a:r>
+              <a:rPr lang="en-US" sz="2800" dirty="0"/>
+              <a:t>(</a:t>
+            </a:r>
+            <a:r>
+              <a:rPr lang="en-US" sz="2800" dirty="0" err="1"/>
+              <a:t>continuando</a:t>
+            </a:r>
+            <a:r>
+              <a:rPr lang="en-US" sz="2800" dirty="0"/>
+              <a:t>…)</a:t>
+            </a:r>
+            <a:endParaRPr lang="en-US" dirty="0"/>
           </a:p>
         </p:txBody>
       </p:sp>

</xml_diff>